<commit_message>
ENH: Removing hometowns since this will be online
</commit_message>
<xml_diff>
--- a/Tutorials/UPR-ACT-2023/Presentations/Introduction.pptx
+++ b/Tutorials/UPR-ACT-2023/Presentations/Introduction.pptx
@@ -111,6 +111,11 @@
       </a:defRPr>
     </a:lvl9pPr>
   </p:defaultTextStyle>
+  <p:extLst>
+    <p:ext uri="{EFAFB233-063F-42B5-8137-9DF3F51BA10A}">
+      <p15:sldGuideLst xmlns:p15="http://schemas.microsoft.com/office/powerpoint/2012/main"/>
+    </p:ext>
+  </p:extLst>
 </p:presentation>
 </file>
 
@@ -196,7 +201,7 @@
           <a:p>
             <a:fld id="{21DDBA3C-72A1-C643-9E94-31B5AD99484B}" type="datetimeFigureOut">
               <a:rPr lang="en-US" smtClean="0"/>
-              <a:t>7/6/23</a:t>
+              <a:t>7/12/23</a:t>
             </a:fld>
             <a:endParaRPr lang="en-US"/>
           </a:p>
@@ -1062,7 +1067,7 @@
           <a:p>
             <a:fld id="{A4CFC1F0-33EF-0E45-A38E-8FB5DCFE4391}" type="datetimeFigureOut">
               <a:rPr lang="en-US" smtClean="0"/>
-              <a:t>7/6/23</a:t>
+              <a:t>7/12/23</a:t>
             </a:fld>
             <a:endParaRPr lang="en-US"/>
           </a:p>
@@ -1471,7 +1476,7 @@
             <a:fld id="{2968F0E1-7F3B-9143-ABF4-576BF984EE9D}" type="datetime4">
               <a:rPr lang="en-US" sz="900" smtClean="0"/>
               <a:pPr/>
-              <a:t>July 6, 2023</a:t>
+              <a:t>July 12, 2023</a:t>
             </a:fld>
             <a:endParaRPr lang="en-US" sz="900" dirty="0"/>
           </a:p>
@@ -1817,7 +1822,7 @@
           <a:p>
             <a:fld id="{A4CFC1F0-33EF-0E45-A38E-8FB5DCFE4391}" type="datetimeFigureOut">
               <a:rPr lang="en-US" smtClean="0"/>
-              <a:t>7/6/23</a:t>
+              <a:t>7/12/23</a:t>
             </a:fld>
             <a:endParaRPr lang="en-US"/>
           </a:p>
@@ -2462,7 +2467,7 @@
           <a:p>
             <a:fld id="{A4CFC1F0-33EF-0E45-A38E-8FB5DCFE4391}" type="datetimeFigureOut">
               <a:rPr lang="en-US" smtClean="0"/>
-              <a:t>7/6/23</a:t>
+              <a:t>7/12/23</a:t>
             </a:fld>
             <a:endParaRPr lang="en-US"/>
           </a:p>
@@ -3604,7 +3609,7 @@
           <a:p>
             <a:fld id="{A4CFC1F0-33EF-0E45-A38E-8FB5DCFE4391}" type="datetimeFigureOut">
               <a:rPr lang="en-US" smtClean="0"/>
-              <a:t>7/6/23</a:t>
+              <a:t>7/12/23</a:t>
             </a:fld>
             <a:endParaRPr lang="en-US"/>
           </a:p>
@@ -4263,7 +4268,7 @@
           <a:p>
             <a:fld id="{A4CFC1F0-33EF-0E45-A38E-8FB5DCFE4391}" type="datetimeFigureOut">
               <a:rPr lang="en-US" smtClean="0"/>
-              <a:t>7/6/23</a:t>
+              <a:t>7/12/23</a:t>
             </a:fld>
             <a:endParaRPr lang="en-US"/>
           </a:p>
@@ -4785,7 +4790,7 @@
           <a:p>
             <a:fld id="{A4CFC1F0-33EF-0E45-A38E-8FB5DCFE4391}" type="datetimeFigureOut">
               <a:rPr lang="en-US" smtClean="0"/>
-              <a:t>7/6/23</a:t>
+              <a:t>7/12/23</a:t>
             </a:fld>
             <a:endParaRPr lang="en-US"/>
           </a:p>
@@ -5656,7 +5661,7 @@
             <a:fld id="{2968F0E1-7F3B-9143-ABF4-576BF984EE9D}" type="datetime4">
               <a:rPr lang="en-US" sz="900" smtClean="0"/>
               <a:pPr/>
-              <a:t>July 6, 2023</a:t>
+              <a:t>July 12, 2023</a:t>
             </a:fld>
             <a:endParaRPr lang="en-US" sz="900" dirty="0"/>
           </a:p>
@@ -6223,7 +6228,7 @@
           <a:p>
             <a:fld id="{A4CFC1F0-33EF-0E45-A38E-8FB5DCFE4391}" type="datetimeFigureOut">
               <a:rPr lang="en-US" smtClean="0"/>
-              <a:t>7/6/23</a:t>
+              <a:t>7/12/23</a:t>
             </a:fld>
             <a:endParaRPr lang="en-US"/>
           </a:p>
@@ -6814,7 +6819,7 @@
           <a:p>
             <a:fld id="{A4CFC1F0-33EF-0E45-A38E-8FB5DCFE4391}" type="datetimeFigureOut">
               <a:rPr lang="en-US" smtClean="0"/>
-              <a:t>7/6/23</a:t>
+              <a:t>7/12/23</a:t>
             </a:fld>
             <a:endParaRPr lang="en-US"/>
           </a:p>
@@ -7589,7 +7594,7 @@
           <a:p>
             <a:fld id="{A4CFC1F0-33EF-0E45-A38E-8FB5DCFE4391}" type="datetimeFigureOut">
               <a:rPr lang="en-US" smtClean="0"/>
-              <a:t>7/6/23</a:t>
+              <a:t>7/12/23</a:t>
             </a:fld>
             <a:endParaRPr lang="en-US"/>
           </a:p>
@@ -8450,7 +8455,7 @@
           <a:p>
             <a:fld id="{A4CFC1F0-33EF-0E45-A38E-8FB5DCFE4391}" type="datetimeFigureOut">
               <a:rPr lang="en-US" smtClean="0"/>
-              <a:t>7/6/23</a:t>
+              <a:t>7/12/23</a:t>
             </a:fld>
             <a:endParaRPr lang="en-US"/>
           </a:p>
@@ -9753,7 +9758,7 @@
           <a:p>
             <a:fld id="{A4CFC1F0-33EF-0E45-A38E-8FB5DCFE4391}" type="datetimeFigureOut">
               <a:rPr lang="en-US" smtClean="0"/>
-              <a:t>7/6/23</a:t>
+              <a:t>7/12/23</a:t>
             </a:fld>
             <a:endParaRPr lang="en-US"/>
           </a:p>
@@ -10600,7 +10605,7 @@
           <a:p>
             <a:fld id="{A4CFC1F0-33EF-0E45-A38E-8FB5DCFE4391}" type="datetimeFigureOut">
               <a:rPr lang="en-US" smtClean="0"/>
-              <a:t>7/6/23</a:t>
+              <a:t>7/12/23</a:t>
             </a:fld>
             <a:endParaRPr lang="en-US"/>
           </a:p>
@@ -11330,7 +11335,7 @@
           <a:p>
             <a:fld id="{A4CFC1F0-33EF-0E45-A38E-8FB5DCFE4391}" type="datetimeFigureOut">
               <a:rPr lang="en-US" smtClean="0"/>
-              <a:t>7/6/23</a:t>
+              <a:t>7/12/23</a:t>
             </a:fld>
             <a:endParaRPr lang="en-US"/>
           </a:p>
@@ -12259,16 +12264,6 @@
             </a:r>
           </a:p>
           <a:p>
-            <a:pPr lvl="1" indent="-314952"/>
-            <a:r>
-              <a:rPr lang="en-US" dirty="0"/>
-              <a:t>South Amboy, New Jersey (now live in Naperville, IL)</a:t>
-            </a:r>
-            <a:endParaRPr lang="en-US" dirty="0">
-              <a:cs typeface="Arial"/>
-            </a:endParaRPr>
-          </a:p>
-          <a:p>
             <a:pPr lvl="1"/>
             <a:r>
               <a:rPr lang="en-US" dirty="0"/>
@@ -12512,16 +12507,6 @@
             <a:pPr lvl="1" indent="-314952"/>
             <a:r>
               <a:rPr lang="en-US" dirty="0"/>
-              <a:t>Plainfield, IL (Now live in Woodridge, IL)</a:t>
-            </a:r>
-            <a:endParaRPr lang="en-US" dirty="0">
-              <a:cs typeface="Arial"/>
-            </a:endParaRPr>
-          </a:p>
-          <a:p>
-            <a:pPr lvl="1" indent="-314952"/>
-            <a:r>
-              <a:rPr lang="en-US" dirty="0"/>
               <a:t>College(s)</a:t>
             </a:r>
             <a:endParaRPr lang="en-US" dirty="0">
@@ -12760,15 +12745,6 @@
               <a:t>Where you are from</a:t>
             </a:r>
             <a:endParaRPr lang="en-US" dirty="0"/>
-          </a:p>
-          <a:p>
-            <a:pPr lvl="1" indent="-314952"/>
-            <a:r>
-              <a:rPr lang="en-US" dirty="0">
-                <a:cs typeface="Arial"/>
-              </a:rPr>
-              <a:t>Upsala, MN</a:t>
-            </a:r>
           </a:p>
           <a:p>
             <a:pPr lvl="1" indent="-314952"/>

</xml_diff>